<commit_message>
Actualización de Documentos y aplicación para hito 3
</commit_message>
<xml_diff>
--- a/3 Construcción/Presentacion semana XIV 28 de Noviembre.pptx
+++ b/3 Construcción/Presentacion semana XIV 28 de Noviembre.pptx
@@ -7719,7 +7719,7 @@
           <p:nvPr>
             <p:extLst>
               <p:ext uri="{D42A27DB-BD31-4B8C-83A1-F6EECF244321}">
-                <p14:modId xmlns:p14="http://schemas.microsoft.com/office/powerpoint/2010/main" val="3149269838"/>
+                <p14:modId xmlns:p14="http://schemas.microsoft.com/office/powerpoint/2010/main" val="2300888179"/>
               </p:ext>
             </p:extLst>
           </p:nvPr>
@@ -7762,7 +7762,16 @@
                             <a:schemeClr val="tx1"/>
                           </a:solidFill>
                         </a:rPr>
-                        <a:t>Omar Pizarro: 11:15</a:t>
+                        <a:t>Omar Pizarro: </a:t>
+                      </a:r>
+                      <a:r>
+                        <a:rPr lang="es-CL" sz="1600" b="0" dirty="0" smtClean="0">
+                          <a:ln/>
+                          <a:solidFill>
+                            <a:schemeClr val="tx1"/>
+                          </a:solidFill>
+                        </a:rPr>
+                        <a:t>15:11</a:t>
                       </a:r>
                       <a:endParaRPr lang="es-CL" sz="1600" b="0" baseline="0" dirty="0" smtClean="0">
                         <a:ln/>
@@ -7780,7 +7789,16 @@
                             <a:schemeClr val="tx1"/>
                           </a:solidFill>
                         </a:rPr>
-                        <a:t>Juan Carlos Garcés: 11:18</a:t>
+                        <a:t>Juan Carlos Garcés: </a:t>
+                      </a:r>
+                      <a:r>
+                        <a:rPr lang="es-CL" sz="1600" b="0" dirty="0" smtClean="0">
+                          <a:ln/>
+                          <a:solidFill>
+                            <a:schemeClr val="tx1"/>
+                          </a:solidFill>
+                        </a:rPr>
+                        <a:t>15:11</a:t>
                       </a:r>
                       <a:endParaRPr lang="es-CL" dirty="0"/>
                     </a:p>
@@ -7929,285 +7947,6 @@
       </p:sp>
       <p:graphicFrame>
         <p:nvGraphicFramePr>
-          <p:cNvPr id="5" name="Tabla 4"/>
-          <p:cNvGraphicFramePr>
-            <a:graphicFrameLocks noGrp="1"/>
-          </p:cNvGraphicFramePr>
-          <p:nvPr>
-            <p:extLst>
-              <p:ext uri="{D42A27DB-BD31-4B8C-83A1-F6EECF244321}">
-                <p14:modId xmlns:p14="http://schemas.microsoft.com/office/powerpoint/2010/main" val="1049709533"/>
-              </p:ext>
-            </p:extLst>
-          </p:nvPr>
-        </p:nvGraphicFramePr>
-        <p:xfrm>
-          <a:off x="7077334" y="2426143"/>
-          <a:ext cx="3324294" cy="750570"/>
-        </p:xfrm>
-        <a:graphic>
-          <a:graphicData uri="http://schemas.openxmlformats.org/drawingml/2006/table">
-            <a:tbl>
-              <a:tblPr/>
-              <a:tblGrid>
-                <a:gridCol w="3324294"/>
-              </a:tblGrid>
-              <a:tr h="115381">
-                <a:tc>
-                  <a:txBody>
-                    <a:bodyPr/>
-                    <a:lstStyle/>
-                    <a:p>
-                      <a:r>
-                        <a:rPr lang="es-CL" sz="1400" dirty="0">
-                          <a:solidFill>
-                            <a:srgbClr val="363636"/>
-                          </a:solidFill>
-                          <a:effectLst/>
-                          <a:latin typeface="Segoe UI" panose="020B0502040204020203" pitchFamily="34" charset="0"/>
-                        </a:rPr>
-                        <a:t>Nombre de tarea</a:t>
-                      </a:r>
-                      <a:endParaRPr lang="es-CL" sz="1400" dirty="0">
-                        <a:effectLst/>
-                        <a:latin typeface="Segoe UI" panose="020B0502040204020203" pitchFamily="34" charset="0"/>
-                      </a:endParaRPr>
-                    </a:p>
-                  </a:txBody>
-                  <a:tcPr marL="9525" marR="9525" marT="9525" marB="9525" anchor="ctr">
-                    <a:lnL w="6350" cap="flat" cmpd="sng" algn="ctr">
-                      <a:solidFill>
-                        <a:srgbClr val="B1BBCC"/>
-                      </a:solidFill>
-                      <a:prstDash val="solid"/>
-                      <a:round/>
-                      <a:headEnd type="none" w="med" len="med"/>
-                      <a:tailEnd type="none" w="med" len="med"/>
-                    </a:lnL>
-                    <a:lnR w="6350" cap="flat" cmpd="sng" algn="ctr">
-                      <a:solidFill>
-                        <a:srgbClr val="B1BBCC"/>
-                      </a:solidFill>
-                      <a:prstDash val="solid"/>
-                      <a:round/>
-                      <a:headEnd type="none" w="med" len="med"/>
-                      <a:tailEnd type="none" w="med" len="med"/>
-                    </a:lnR>
-                    <a:lnT w="6350" cap="flat" cmpd="sng" algn="ctr">
-                      <a:solidFill>
-                        <a:srgbClr val="B1BBCC"/>
-                      </a:solidFill>
-                      <a:prstDash val="solid"/>
-                      <a:round/>
-                      <a:headEnd type="none" w="med" len="med"/>
-                      <a:tailEnd type="none" w="med" len="med"/>
-                    </a:lnT>
-                    <a:lnB w="6350" cap="flat" cmpd="sng" algn="ctr">
-                      <a:solidFill>
-                        <a:srgbClr val="B1BBCC"/>
-                      </a:solidFill>
-                      <a:prstDash val="solid"/>
-                      <a:round/>
-                      <a:headEnd type="none" w="med" len="med"/>
-                      <a:tailEnd type="none" w="med" len="med"/>
-                    </a:lnB>
-                    <a:solidFill>
-                      <a:srgbClr val="DFE3E8"/>
-                    </a:solidFill>
-                  </a:tcPr>
-                </a:tc>
-              </a:tr>
-              <a:tr h="137894">
-                <a:tc>
-                  <a:txBody>
-                    <a:bodyPr/>
-                    <a:lstStyle/>
-                    <a:p>
-                      <a:endParaRPr lang="es-CL" sz="900" dirty="0">
-                        <a:effectLst/>
-                        <a:latin typeface="Segoe UI" panose="020B0502040204020203" pitchFamily="34" charset="0"/>
-                      </a:endParaRPr>
-                    </a:p>
-                  </a:txBody>
-                  <a:tcPr marL="7620" marR="7620" marT="7620" marB="7620" anchor="ctr">
-                    <a:lnL w="6350" cap="flat" cmpd="sng" algn="ctr">
-                      <a:solidFill>
-                        <a:srgbClr val="B1BBCC"/>
-                      </a:solidFill>
-                      <a:prstDash val="solid"/>
-                      <a:round/>
-                      <a:headEnd type="none" w="med" len="med"/>
-                      <a:tailEnd type="none" w="med" len="med"/>
-                    </a:lnL>
-                    <a:lnR w="6350" cap="flat" cmpd="sng" algn="ctr">
-                      <a:solidFill>
-                        <a:srgbClr val="B1BBCC"/>
-                      </a:solidFill>
-                      <a:prstDash val="solid"/>
-                      <a:round/>
-                      <a:headEnd type="none" w="med" len="med"/>
-                      <a:tailEnd type="none" w="med" len="med"/>
-                    </a:lnR>
-                    <a:lnT w="6350" cap="flat" cmpd="sng" algn="ctr">
-                      <a:solidFill>
-                        <a:srgbClr val="B1BBCC"/>
-                      </a:solidFill>
-                      <a:prstDash val="solid"/>
-                      <a:round/>
-                      <a:headEnd type="none" w="med" len="med"/>
-                      <a:tailEnd type="none" w="med" len="med"/>
-                    </a:lnT>
-                    <a:lnB w="6350" cap="flat" cmpd="sng" algn="ctr">
-                      <a:solidFill>
-                        <a:srgbClr val="B1BBCC"/>
-                      </a:solidFill>
-                      <a:prstDash val="solid"/>
-                      <a:round/>
-                      <a:headEnd type="none" w="med" len="med"/>
-                      <a:tailEnd type="none" w="med" len="med"/>
-                    </a:lnB>
-                    <a:solidFill>
-                      <a:srgbClr val="FFFFFF"/>
-                    </a:solidFill>
-                  </a:tcPr>
-                </a:tc>
-              </a:tr>
-              <a:tr h="137894">
-                <a:tc>
-                  <a:txBody>
-                    <a:bodyPr/>
-                    <a:lstStyle/>
-                    <a:p>
-                      <a:r>
-                        <a:rPr lang="es-CL" sz="1100">
-                          <a:solidFill>
-                            <a:srgbClr val="000000"/>
-                          </a:solidFill>
-                          <a:effectLst/>
-                          <a:latin typeface="Calibri" panose="020F0502020204030204" pitchFamily="34" charset="0"/>
-                        </a:rPr>
-                        <a:t>Funcionalidades del Modulo</a:t>
-                      </a:r>
-                      <a:endParaRPr lang="es-CL" sz="1100">
-                        <a:effectLst/>
-                        <a:latin typeface="Calibri" panose="020F0502020204030204" pitchFamily="34" charset="0"/>
-                      </a:endParaRPr>
-                    </a:p>
-                  </a:txBody>
-                  <a:tcPr marL="7620" marR="7620" marT="7620" marB="7620" anchor="ctr">
-                    <a:lnL w="6350" cap="flat" cmpd="sng" algn="ctr">
-                      <a:solidFill>
-                        <a:srgbClr val="B1BBCC"/>
-                      </a:solidFill>
-                      <a:prstDash val="solid"/>
-                      <a:round/>
-                      <a:headEnd type="none" w="med" len="med"/>
-                      <a:tailEnd type="none" w="med" len="med"/>
-                    </a:lnL>
-                    <a:lnR w="6350" cap="flat" cmpd="sng" algn="ctr">
-                      <a:solidFill>
-                        <a:srgbClr val="B1BBCC"/>
-                      </a:solidFill>
-                      <a:prstDash val="solid"/>
-                      <a:round/>
-                      <a:headEnd type="none" w="med" len="med"/>
-                      <a:tailEnd type="none" w="med" len="med"/>
-                    </a:lnR>
-                    <a:lnT w="6350" cap="flat" cmpd="sng" algn="ctr">
-                      <a:solidFill>
-                        <a:srgbClr val="B1BBCC"/>
-                      </a:solidFill>
-                      <a:prstDash val="solid"/>
-                      <a:round/>
-                      <a:headEnd type="none" w="med" len="med"/>
-                      <a:tailEnd type="none" w="med" len="med"/>
-                    </a:lnT>
-                    <a:lnB w="6350" cap="flat" cmpd="sng" algn="ctr">
-                      <a:solidFill>
-                        <a:srgbClr val="B1BBCC"/>
-                      </a:solidFill>
-                      <a:prstDash val="solid"/>
-                      <a:round/>
-                      <a:headEnd type="none" w="med" len="med"/>
-                      <a:tailEnd type="none" w="med" len="med"/>
-                    </a:lnB>
-                    <a:solidFill>
-                      <a:srgbClr val="FFFFFF"/>
-                    </a:solidFill>
-                  </a:tcPr>
-                </a:tc>
-              </a:tr>
-              <a:tr h="137894">
-                <a:tc>
-                  <a:txBody>
-                    <a:bodyPr/>
-                    <a:lstStyle/>
-                    <a:p>
-                      <a:r>
-                        <a:rPr lang="es-CL" sz="1100" dirty="0">
-                          <a:solidFill>
-                            <a:srgbClr val="000000"/>
-                          </a:solidFill>
-                          <a:effectLst/>
-                          <a:latin typeface="Calibri" panose="020F0502020204030204" pitchFamily="34" charset="0"/>
-                        </a:rPr>
-                        <a:t>Integración GUI / Funcionalidades</a:t>
-                      </a:r>
-                      <a:endParaRPr lang="es-CL" sz="1100" dirty="0">
-                        <a:effectLst/>
-                        <a:latin typeface="Calibri" panose="020F0502020204030204" pitchFamily="34" charset="0"/>
-                      </a:endParaRPr>
-                    </a:p>
-                  </a:txBody>
-                  <a:tcPr marL="7620" marR="7620" marT="7620" marB="7620" anchor="ctr">
-                    <a:lnL w="6350" cap="flat" cmpd="sng" algn="ctr">
-                      <a:solidFill>
-                        <a:srgbClr val="B1BBCC"/>
-                      </a:solidFill>
-                      <a:prstDash val="solid"/>
-                      <a:round/>
-                      <a:headEnd type="none" w="med" len="med"/>
-                      <a:tailEnd type="none" w="med" len="med"/>
-                    </a:lnL>
-                    <a:lnR w="6350" cap="flat" cmpd="sng" algn="ctr">
-                      <a:solidFill>
-                        <a:srgbClr val="B1BBCC"/>
-                      </a:solidFill>
-                      <a:prstDash val="solid"/>
-                      <a:round/>
-                      <a:headEnd type="none" w="med" len="med"/>
-                      <a:tailEnd type="none" w="med" len="med"/>
-                    </a:lnR>
-                    <a:lnT w="6350" cap="flat" cmpd="sng" algn="ctr">
-                      <a:solidFill>
-                        <a:srgbClr val="B1BBCC"/>
-                      </a:solidFill>
-                      <a:prstDash val="solid"/>
-                      <a:round/>
-                      <a:headEnd type="none" w="med" len="med"/>
-                      <a:tailEnd type="none" w="med" len="med"/>
-                    </a:lnT>
-                    <a:lnB w="6350" cap="flat" cmpd="sng" algn="ctr">
-                      <a:solidFill>
-                        <a:srgbClr val="B1BBCC"/>
-                      </a:solidFill>
-                      <a:prstDash val="solid"/>
-                      <a:round/>
-                      <a:headEnd type="none" w="med" len="med"/>
-                      <a:tailEnd type="none" w="med" len="med"/>
-                    </a:lnB>
-                    <a:solidFill>
-                      <a:srgbClr val="FFFFFF"/>
-                    </a:solidFill>
-                  </a:tcPr>
-                </a:tc>
-              </a:tr>
-            </a:tbl>
-          </a:graphicData>
-        </a:graphic>
-      </p:graphicFrame>
-      <p:graphicFrame>
-        <p:nvGraphicFramePr>
           <p:cNvPr id="6" name="Tabla 5"/>
           <p:cNvGraphicFramePr>
             <a:graphicFrameLocks noGrp="1"/>
@@ -8215,14 +7954,14 @@
           <p:nvPr>
             <p:extLst>
               <p:ext uri="{D42A27DB-BD31-4B8C-83A1-F6EECF244321}">
-                <p14:modId xmlns:p14="http://schemas.microsoft.com/office/powerpoint/2010/main" val="3385169956"/>
+                <p14:modId xmlns:p14="http://schemas.microsoft.com/office/powerpoint/2010/main" val="3193971750"/>
               </p:ext>
             </p:extLst>
           </p:nvPr>
         </p:nvGraphicFramePr>
         <p:xfrm>
-          <a:off x="7510547" y="3836073"/>
-          <a:ext cx="3322454" cy="520267"/>
+          <a:off x="7848867" y="2663713"/>
+          <a:ext cx="3322454" cy="1238250"/>
         </p:xfrm>
         <a:graphic>
           <a:graphicData uri="http://schemas.openxmlformats.org/drawingml/2006/table">
@@ -8300,12 +8039,183 @@
                     <a:lstStyle/>
                     <a:p>
                       <a:r>
-                        <a:rPr lang="es-CL" sz="1450" dirty="0" smtClean="0">
+                        <a:rPr lang="es-CL" sz="1050" dirty="0" smtClean="0">
                           <a:effectLst/>
                           <a:latin typeface="Calibri" panose="020F0502020204030204" pitchFamily="34" charset="0"/>
                         </a:rPr>
-                        <a:t>Iteración 4</a:t>
+                        <a:t> GUI del modulo</a:t>
                       </a:r>
+                    </a:p>
+                    <a:p>
+                      <a:endParaRPr lang="es-CL" sz="1050" dirty="0">
+                        <a:effectLst/>
+                        <a:latin typeface="Calibri" panose="020F0502020204030204" pitchFamily="34" charset="0"/>
+                      </a:endParaRPr>
+                    </a:p>
+                  </a:txBody>
+                  <a:tcPr marL="7620" marR="7620" marT="7620" marB="7620" anchor="ctr">
+                    <a:lnL w="6350" cap="flat" cmpd="sng" algn="ctr">
+                      <a:solidFill>
+                        <a:srgbClr val="B1BBCC"/>
+                      </a:solidFill>
+                      <a:prstDash val="solid"/>
+                      <a:round/>
+                      <a:headEnd type="none" w="med" len="med"/>
+                      <a:tailEnd type="none" w="med" len="med"/>
+                    </a:lnL>
+                    <a:lnR w="6350" cap="flat" cmpd="sng" algn="ctr">
+                      <a:solidFill>
+                        <a:srgbClr val="B1BBCC"/>
+                      </a:solidFill>
+                      <a:prstDash val="solid"/>
+                      <a:round/>
+                      <a:headEnd type="none" w="med" len="med"/>
+                      <a:tailEnd type="none" w="med" len="med"/>
+                    </a:lnR>
+                    <a:lnT w="6350" cap="flat" cmpd="sng" algn="ctr">
+                      <a:solidFill>
+                        <a:srgbClr val="B1BBCC"/>
+                      </a:solidFill>
+                      <a:prstDash val="solid"/>
+                      <a:round/>
+                      <a:headEnd type="none" w="med" len="med"/>
+                      <a:tailEnd type="none" w="med" len="med"/>
+                    </a:lnT>
+                    <a:lnB w="6350" cap="flat" cmpd="sng" algn="ctr">
+                      <a:solidFill>
+                        <a:srgbClr val="B1BBCC"/>
+                      </a:solidFill>
+                      <a:prstDash val="solid"/>
+                      <a:round/>
+                      <a:headEnd type="none" w="med" len="med"/>
+                      <a:tailEnd type="none" w="med" len="med"/>
+                    </a:lnB>
+                    <a:solidFill>
+                      <a:srgbClr val="FFFFFF"/>
+                    </a:solidFill>
+                  </a:tcPr>
+                </a:tc>
+              </a:tr>
+              <a:tr h="287857">
+                <a:tc>
+                  <a:txBody>
+                    <a:bodyPr/>
+                    <a:lstStyle/>
+                    <a:p>
+                      <a:pPr marL="0" marR="0" indent="0" algn="l" defTabSz="457200" rtl="0" eaLnBrk="1" fontAlgn="auto" latinLnBrk="0" hangingPunct="1">
+                        <a:lnSpc>
+                          <a:spcPct val="100000"/>
+                        </a:lnSpc>
+                        <a:spcBef>
+                          <a:spcPts val="0"/>
+                        </a:spcBef>
+                        <a:spcAft>
+                          <a:spcPts val="0"/>
+                        </a:spcAft>
+                        <a:buClrTx/>
+                        <a:buSzTx/>
+                        <a:buFontTx/>
+                        <a:buNone/>
+                        <a:tabLst/>
+                        <a:defRPr/>
+                      </a:pPr>
+                      <a:r>
+                        <a:rPr lang="es-CL" sz="1050" dirty="0" smtClean="0">
+                          <a:effectLst/>
+                          <a:latin typeface="Calibri" panose="020F0502020204030204" pitchFamily="34" charset="0"/>
+                        </a:rPr>
+                        <a:t> Funcionalidades del Modulo</a:t>
+                      </a:r>
+                    </a:p>
+                    <a:p>
+                      <a:endParaRPr lang="es-CL" sz="1050" dirty="0">
+                        <a:effectLst/>
+                        <a:latin typeface="Calibri" panose="020F0502020204030204" pitchFamily="34" charset="0"/>
+                      </a:endParaRPr>
+                    </a:p>
+                  </a:txBody>
+                  <a:tcPr marL="7620" marR="7620" marT="7620" marB="7620" anchor="ctr">
+                    <a:lnL w="6350" cap="flat" cmpd="sng" algn="ctr">
+                      <a:solidFill>
+                        <a:srgbClr val="B1BBCC"/>
+                      </a:solidFill>
+                      <a:prstDash val="solid"/>
+                      <a:round/>
+                      <a:headEnd type="none" w="med" len="med"/>
+                      <a:tailEnd type="none" w="med" len="med"/>
+                    </a:lnL>
+                    <a:lnR w="6350" cap="flat" cmpd="sng" algn="ctr">
+                      <a:solidFill>
+                        <a:srgbClr val="B1BBCC"/>
+                      </a:solidFill>
+                      <a:prstDash val="solid"/>
+                      <a:round/>
+                      <a:headEnd type="none" w="med" len="med"/>
+                      <a:tailEnd type="none" w="med" len="med"/>
+                    </a:lnR>
+                    <a:lnT w="6350" cap="flat" cmpd="sng" algn="ctr">
+                      <a:solidFill>
+                        <a:srgbClr val="B1BBCC"/>
+                      </a:solidFill>
+                      <a:prstDash val="solid"/>
+                      <a:round/>
+                      <a:headEnd type="none" w="med" len="med"/>
+                      <a:tailEnd type="none" w="med" len="med"/>
+                    </a:lnT>
+                    <a:lnB w="6350" cap="flat" cmpd="sng" algn="ctr">
+                      <a:solidFill>
+                        <a:srgbClr val="B1BBCC"/>
+                      </a:solidFill>
+                      <a:prstDash val="solid"/>
+                      <a:round/>
+                      <a:headEnd type="none" w="med" len="med"/>
+                      <a:tailEnd type="none" w="med" len="med"/>
+                    </a:lnB>
+                    <a:solidFill>
+                      <a:srgbClr val="FFFFFF"/>
+                    </a:solidFill>
+                  </a:tcPr>
+                </a:tc>
+              </a:tr>
+              <a:tr h="287857">
+                <a:tc>
+                  <a:txBody>
+                    <a:bodyPr/>
+                    <a:lstStyle/>
+                    <a:p>
+                      <a:pPr marL="0" marR="0" indent="0" algn="l" defTabSz="457200" rtl="0" eaLnBrk="1" fontAlgn="auto" latinLnBrk="0" hangingPunct="1">
+                        <a:lnSpc>
+                          <a:spcPct val="100000"/>
+                        </a:lnSpc>
+                        <a:spcBef>
+                          <a:spcPts val="0"/>
+                        </a:spcBef>
+                        <a:spcAft>
+                          <a:spcPts val="0"/>
+                        </a:spcAft>
+                        <a:buClrTx/>
+                        <a:buSzTx/>
+                        <a:buFontTx/>
+                        <a:buNone/>
+                        <a:tabLst/>
+                        <a:defRPr/>
+                      </a:pPr>
+                      <a:r>
+                        <a:rPr lang="es-CL" sz="1050" dirty="0" err="1" smtClean="0">
+                          <a:effectLst/>
+                          <a:latin typeface="Calibri" panose="020F0502020204030204" pitchFamily="34" charset="0"/>
+                        </a:rPr>
+                        <a:t>Integracion</a:t>
+                      </a:r>
+                      <a:r>
+                        <a:rPr lang="es-CL" sz="1050" dirty="0" smtClean="0">
+                          <a:effectLst/>
+                          <a:latin typeface="Calibri" panose="020F0502020204030204" pitchFamily="34" charset="0"/>
+                        </a:rPr>
+                        <a:t> GUI / Funcionalidades</a:t>
+                      </a:r>
+                    </a:p>
+                    <a:p>
                       <a:endParaRPr lang="es-CL" sz="1050" dirty="0">
                         <a:effectLst/>
                         <a:latin typeface="Calibri" panose="020F0502020204030204" pitchFamily="34" charset="0"/>
@@ -8361,43 +8271,13 @@
       </p:graphicFrame>
       <p:sp>
         <p:nvSpPr>
-          <p:cNvPr id="19" name="CuadroTexto 18"/>
-          <p:cNvSpPr txBox="1"/>
-          <p:nvPr/>
-        </p:nvSpPr>
-        <p:spPr>
-          <a:xfrm>
-            <a:off x="6869622" y="2033405"/>
-            <a:ext cx="2410728" cy="369332"/>
-          </a:xfrm>
-          <a:prstGeom prst="rect">
-            <a:avLst/>
-          </a:prstGeom>
-          <a:noFill/>
-        </p:spPr>
-        <p:txBody>
-          <a:bodyPr wrap="square" rtlCol="0">
-            <a:spAutoFit/>
-          </a:bodyPr>
-          <a:lstStyle/>
-          <a:p>
-            <a:r>
-              <a:rPr lang="es-CL" dirty="0" smtClean="0"/>
-              <a:t>Tareas Terminadas</a:t>
-            </a:r>
-            <a:endParaRPr lang="es-CL" dirty="0"/>
-          </a:p>
-        </p:txBody>
-      </p:sp>
-      <p:sp>
-        <p:nvSpPr>
           <p:cNvPr id="8" name="CuadroTexto 7"/>
           <p:cNvSpPr txBox="1"/>
           <p:nvPr/>
         </p:nvSpPr>
         <p:spPr>
           <a:xfrm>
-            <a:off x="6878414" y="3421411"/>
+            <a:off x="6869622" y="2270404"/>
             <a:ext cx="2512328" cy="369332"/>
           </a:xfrm>
           <a:prstGeom prst="rect">
@@ -8448,7 +8328,15 @@
                   <a:srgbClr val="FF0000"/>
                 </a:solidFill>
               </a:rPr>
-              <a:t>|Reporte Semanal |Reporte de Pruebas|</a:t>
+              <a:t>|Reporte </a:t>
+            </a:r>
+            <a:r>
+              <a:rPr lang="es-CL" b="1" dirty="0" smtClean="0">
+                <a:solidFill>
+                  <a:srgbClr val="FF0000"/>
+                </a:solidFill>
+              </a:rPr>
+              <a:t>Semanal|</a:t>
             </a:r>
             <a:endParaRPr lang="es-CL" b="1" dirty="0">
               <a:solidFill>
@@ -8500,7 +8388,15 @@
                   <a:srgbClr val="FF0000"/>
                 </a:solidFill>
               </a:rPr>
-              <a:t>86,6%</a:t>
+              <a:t>92,72</a:t>
+            </a:r>
+            <a:r>
+              <a:rPr lang="es-CL" dirty="0" smtClean="0">
+                <a:solidFill>
+                  <a:srgbClr val="FF0000"/>
+                </a:solidFill>
+              </a:rPr>
+              <a:t>%</a:t>
             </a:r>
             <a:endParaRPr lang="es-CL" dirty="0">
               <a:solidFill>
@@ -8615,13 +8511,13 @@
           <p:nvPr>
             <p:extLst>
               <p:ext uri="{D42A27DB-BD31-4B8C-83A1-F6EECF244321}">
-                <p14:modId xmlns:p14="http://schemas.microsoft.com/office/powerpoint/2010/main" val="910048716"/>
+                <p14:modId xmlns:p14="http://schemas.microsoft.com/office/powerpoint/2010/main" val="3165723313"/>
               </p:ext>
             </p:extLst>
           </p:nvPr>
         </p:nvGraphicFramePr>
         <p:xfrm>
-          <a:off x="7857156" y="5097048"/>
+          <a:off x="7855803" y="4519357"/>
           <a:ext cx="2846387" cy="889471"/>
         </p:xfrm>
         <a:graphic>
@@ -8937,7 +8833,7 @@
                           <a:effectLst/>
                           <a:latin typeface="+mn-lt"/>
                         </a:rPr>
-                        <a:t>51</a:t>
+                        <a:t>53</a:t>
                       </a:r>
                       <a:endParaRPr lang="es-CL" sz="1050" dirty="0">
                         <a:solidFill>
@@ -8997,14 +8893,14 @@
                     <a:p>
                       <a:pPr algn="ctr"/>
                       <a:r>
-                        <a:rPr lang="es-CL" sz="1050" dirty="0" smtClean="0">
+                        <a:rPr lang="es-CL" sz="1050" smtClean="0">
                           <a:solidFill>
                             <a:schemeClr val="tx1"/>
                           </a:solidFill>
                           <a:effectLst/>
                           <a:latin typeface="+mn-lt"/>
                         </a:rPr>
-                        <a:t>52</a:t>
+                        <a:t>54</a:t>
                       </a:r>
                       <a:endParaRPr lang="es-CL" sz="1050" dirty="0">
                         <a:solidFill>
@@ -9071,7 +8967,7 @@
           <p:nvPr>
             <p:extLst>
               <p:ext uri="{D42A27DB-BD31-4B8C-83A1-F6EECF244321}">
-                <p14:modId xmlns:p14="http://schemas.microsoft.com/office/powerpoint/2010/main" val="2899879933"/>
+                <p14:modId xmlns:p14="http://schemas.microsoft.com/office/powerpoint/2010/main" val="613445709"/>
               </p:ext>
             </p:extLst>
           </p:nvPr>
@@ -9406,14 +9302,24 @@
                     <a:lstStyle/>
                     <a:p>
                       <a:r>
-                        <a:rPr lang="es-CL" sz="1200" smtClean="0">
+                        <a:rPr lang="es-CL" sz="1200" dirty="0" smtClean="0">
                           <a:solidFill>
                             <a:srgbClr val="000000"/>
                           </a:solidFill>
                           <a:effectLst/>
                           <a:latin typeface="Calibri" panose="020F0502020204030204" pitchFamily="34" charset="0"/>
                         </a:rPr>
-                        <a:t>Escasez </a:t>
+                        <a:t>Escases</a:t>
+                      </a:r>
+                      <a:r>
+                        <a:rPr lang="es-CL" sz="1200" baseline="0" dirty="0" smtClean="0">
+                          <a:solidFill>
+                            <a:srgbClr val="000000"/>
+                          </a:solidFill>
+                          <a:effectLst/>
+                          <a:latin typeface="Calibri" panose="020F0502020204030204" pitchFamily="34" charset="0"/>
+                        </a:rPr>
+                        <a:t> </a:t>
                       </a:r>
                       <a:r>
                         <a:rPr lang="es-CL" sz="1200" dirty="0" smtClean="0">
@@ -9423,7 +9329,17 @@
                           <a:effectLst/>
                           <a:latin typeface="Calibri" panose="020F0502020204030204" pitchFamily="34" charset="0"/>
                         </a:rPr>
-                        <a:t>de Recursos Humanos.</a:t>
+                        <a:t>de </a:t>
+                      </a:r>
+                      <a:r>
+                        <a:rPr lang="es-CL" sz="1200" dirty="0" smtClean="0">
+                          <a:solidFill>
+                            <a:srgbClr val="000000"/>
+                          </a:solidFill>
+                          <a:effectLst/>
+                          <a:latin typeface="Calibri" panose="020F0502020204030204" pitchFamily="34" charset="0"/>
+                        </a:rPr>
+                        <a:t>Recursos Humanos.</a:t>
                       </a:r>
                       <a:endParaRPr lang="es-CL" sz="1200" dirty="0">
                         <a:effectLst/>
@@ -9488,8 +9404,15 @@
                           <a:effectLst/>
                           <a:latin typeface="Calibri" panose="020F0502020204030204" pitchFamily="34" charset="0"/>
                         </a:rPr>
-                        <a:t>R14</a:t>
+                        <a:t>R15</a:t>
                       </a:r>
+                      <a:endParaRPr lang="es-CL" sz="1200" dirty="0" smtClean="0">
+                        <a:solidFill>
+                          <a:srgbClr val="000000"/>
+                        </a:solidFill>
+                        <a:effectLst/>
+                        <a:latin typeface="Calibri" panose="020F0502020204030204" pitchFamily="34" charset="0"/>
+                      </a:endParaRPr>
                     </a:p>
                   </a:txBody>
                   <a:tcPr marL="9525" marR="9525" marT="9525" marB="9525" anchor="ctr">
@@ -9544,7 +9467,14 @@
                           <a:effectLst/>
                           <a:latin typeface="Calibri" panose="020F0502020204030204" pitchFamily="34" charset="0"/>
                         </a:rPr>
-                        <a:t>Cierre del proyecto</a:t>
+                        <a:t>Falla</a:t>
+                      </a:r>
+                      <a:r>
+                        <a:rPr lang="es-CL" sz="1200" baseline="0" dirty="0" smtClean="0">
+                          <a:effectLst/>
+                          <a:latin typeface="Calibri" panose="020F0502020204030204" pitchFamily="34" charset="0"/>
+                        </a:rPr>
+                        <a:t> de herramientas de trabajo</a:t>
                       </a:r>
                       <a:endParaRPr lang="es-CL" sz="1200" dirty="0">
                         <a:effectLst/>
@@ -9689,7 +9619,7 @@
           <p:nvPr>
             <p:extLst>
               <p:ext uri="{D42A27DB-BD31-4B8C-83A1-F6EECF244321}">
-                <p14:modId xmlns:p14="http://schemas.microsoft.com/office/powerpoint/2010/main" val="57311266"/>
+                <p14:modId xmlns:p14="http://schemas.microsoft.com/office/powerpoint/2010/main" val="3629600275"/>
               </p:ext>
             </p:extLst>
           </p:nvPr>
@@ -9848,8 +9778,15 @@
                           <a:effectLst/>
                           <a:latin typeface="Calibri" panose="020F0502020204030204" pitchFamily="34" charset="0"/>
                         </a:rPr>
-                        <a:t>22:33</a:t>
+                        <a:t>30:22</a:t>
                       </a:r>
+                      <a:endParaRPr lang="es-CL" sz="1200" dirty="0" smtClean="0">
+                        <a:solidFill>
+                          <a:srgbClr val="000000"/>
+                        </a:solidFill>
+                        <a:effectLst/>
+                        <a:latin typeface="Calibri" panose="020F0502020204030204" pitchFamily="34" charset="0"/>
+                      </a:endParaRPr>
                     </a:p>
                   </a:txBody>
                   <a:tcPr marL="9525" marR="9525" marT="9525" marB="9525" anchor="ctr">
@@ -9994,20 +9931,12 @@
               <a:t>Total: </a:t>
             </a:r>
             <a:r>
-              <a:rPr lang="es-CL" sz="1400" b="1" dirty="0">
-                <a:solidFill>
-                  <a:srgbClr val="92D050"/>
-                </a:solidFill>
-              </a:rPr>
-              <a:t>$ $ </a:t>
-            </a:r>
-            <a:r>
               <a:rPr lang="es-CL" sz="1400" b="1" dirty="0" smtClean="0">
                 <a:solidFill>
                   <a:srgbClr val="92D050"/>
                 </a:solidFill>
               </a:rPr>
-              <a:t>1.399.132 .-</a:t>
+              <a:t>$ 152.706.-</a:t>
             </a:r>
             <a:endParaRPr lang="es-CL" sz="1400" b="1" dirty="0">
               <a:solidFill>
@@ -10026,7 +9955,7 @@
           <p:nvPr>
             <p:extLst>
               <p:ext uri="{D42A27DB-BD31-4B8C-83A1-F6EECF244321}">
-                <p14:modId xmlns:p14="http://schemas.microsoft.com/office/powerpoint/2010/main" val="1189048879"/>
+                <p14:modId xmlns:p14="http://schemas.microsoft.com/office/powerpoint/2010/main" val="1616526877"/>
               </p:ext>
             </p:extLst>
           </p:nvPr>
@@ -10198,7 +10127,7 @@
                           </a:solidFill>
                           <a:effectLst/>
                         </a:rPr>
-                        <a:t>40,4</a:t>
+                        <a:t>43,0</a:t>
                       </a:r>
                       <a:r>
                         <a:rPr lang="es-CL" sz="1200" b="1" cap="none" spc="0" baseline="0" dirty="0" smtClean="0">
@@ -10208,7 +10137,17 @@
                           </a:solidFill>
                           <a:effectLst/>
                         </a:rPr>
-                        <a:t> %</a:t>
+                        <a:t> </a:t>
+                      </a:r>
+                      <a:r>
+                        <a:rPr lang="es-CL" sz="1200" b="1" cap="none" spc="0" baseline="0" dirty="0" smtClean="0">
+                          <a:ln/>
+                          <a:solidFill>
+                            <a:schemeClr val="tx1"/>
+                          </a:solidFill>
+                          <a:effectLst/>
+                        </a:rPr>
+                        <a:t>%</a:t>
                       </a:r>
                       <a:endParaRPr lang="es-CL" sz="1200" b="1" cap="none" spc="0" dirty="0" smtClean="0">
                         <a:ln/>
@@ -10291,8 +10230,15 @@
                           </a:solidFill>
                           <a:effectLst/>
                         </a:rPr>
-                        <a:t>59,6%</a:t>
+                        <a:t>57,0</a:t>
                       </a:r>
+                      <a:endParaRPr lang="es-CL" sz="1200" b="1" cap="none" spc="0" dirty="0" smtClean="0">
+                        <a:ln/>
+                        <a:solidFill>
+                          <a:schemeClr val="tx1"/>
+                        </a:solidFill>
+                        <a:effectLst/>
+                      </a:endParaRPr>
                     </a:p>
                   </a:txBody>
                   <a:tcPr marL="9525" marR="9525" marT="9525" marB="9525" anchor="ctr">
@@ -10440,7 +10386,7 @@
           <p:nvPr>
             <p:extLst>
               <p:ext uri="{D42A27DB-BD31-4B8C-83A1-F6EECF244321}">
-                <p14:modId xmlns:p14="http://schemas.microsoft.com/office/powerpoint/2010/main" val="1554489783"/>
+                <p14:modId xmlns:p14="http://schemas.microsoft.com/office/powerpoint/2010/main" val="2276831147"/>
               </p:ext>
             </p:extLst>
           </p:nvPr>
@@ -10599,8 +10545,15 @@
                           <a:effectLst/>
                           <a:latin typeface="Calibri" panose="020F0502020204030204" pitchFamily="34" charset="0"/>
                         </a:rPr>
-                        <a:t>R14</a:t>
+                        <a:t>R15</a:t>
                       </a:r>
+                      <a:endParaRPr lang="es-CL" sz="1200" dirty="0" smtClean="0">
+                        <a:solidFill>
+                          <a:srgbClr val="000000"/>
+                        </a:solidFill>
+                        <a:effectLst/>
+                        <a:latin typeface="Calibri" panose="020F0502020204030204" pitchFamily="34" charset="0"/>
+                      </a:endParaRPr>
                     </a:p>
                   </a:txBody>
                   <a:tcPr marL="9525" marR="9525" marT="9525" marB="9525" anchor="ctr">
@@ -10655,14 +10608,14 @@
                           <a:effectLst/>
                           <a:latin typeface="Calibri" panose="020F0502020204030204" pitchFamily="34" charset="0"/>
                         </a:rPr>
-                        <a:t>Cierre</a:t>
+                        <a:t>Falla</a:t>
                       </a:r>
                       <a:r>
                         <a:rPr lang="es-CL" sz="1200" baseline="0" dirty="0" smtClean="0">
                           <a:effectLst/>
                           <a:latin typeface="Calibri" panose="020F0502020204030204" pitchFamily="34" charset="0"/>
                         </a:rPr>
-                        <a:t> del proyecto</a:t>
+                        <a:t> de herramientas de trabajo</a:t>
                       </a:r>
                       <a:endParaRPr lang="es-CL" sz="1200" dirty="0">
                         <a:effectLst/>

</xml_diff>